<commit_message>
[ChangingLogicLevel] presentation was improved
</commit_message>
<xml_diff>
--- a/Tree presentaion.pptx
+++ b/Tree presentaion.pptx
@@ -5,26 +5,33 @@
     <p:sldMasterId id="2147483648" r:id="rId1"/>
   </p:sldMasterIdLst>
   <p:notesMasterIdLst>
-    <p:notesMasterId r:id="rId19"/>
+    <p:notesMasterId r:id="rId26"/>
   </p:notesMasterIdLst>
   <p:sldIdLst>
     <p:sldId id="256" r:id="rId2"/>
-    <p:sldId id="268" r:id="rId3"/>
-    <p:sldId id="269" r:id="rId4"/>
-    <p:sldId id="270" r:id="rId5"/>
-    <p:sldId id="271" r:id="rId6"/>
-    <p:sldId id="272" r:id="rId7"/>
-    <p:sldId id="273" r:id="rId8"/>
-    <p:sldId id="261" r:id="rId9"/>
-    <p:sldId id="262" r:id="rId10"/>
-    <p:sldId id="257" r:id="rId11"/>
-    <p:sldId id="267" r:id="rId12"/>
-    <p:sldId id="263" r:id="rId13"/>
-    <p:sldId id="264" r:id="rId14"/>
-    <p:sldId id="274" r:id="rId15"/>
-    <p:sldId id="275" r:id="rId16"/>
-    <p:sldId id="265" r:id="rId17"/>
-    <p:sldId id="266" r:id="rId18"/>
+    <p:sldId id="280" r:id="rId3"/>
+    <p:sldId id="281" r:id="rId4"/>
+    <p:sldId id="282" r:id="rId5"/>
+    <p:sldId id="283" r:id="rId6"/>
+    <p:sldId id="268" r:id="rId7"/>
+    <p:sldId id="269" r:id="rId8"/>
+    <p:sldId id="270" r:id="rId9"/>
+    <p:sldId id="271" r:id="rId10"/>
+    <p:sldId id="272" r:id="rId11"/>
+    <p:sldId id="273" r:id="rId12"/>
+    <p:sldId id="261" r:id="rId13"/>
+    <p:sldId id="262" r:id="rId14"/>
+    <p:sldId id="257" r:id="rId15"/>
+    <p:sldId id="267" r:id="rId16"/>
+    <p:sldId id="263" r:id="rId17"/>
+    <p:sldId id="264" r:id="rId18"/>
+    <p:sldId id="274" r:id="rId19"/>
+    <p:sldId id="275" r:id="rId20"/>
+    <p:sldId id="277" r:id="rId21"/>
+    <p:sldId id="278" r:id="rId22"/>
+    <p:sldId id="279" r:id="rId23"/>
+    <p:sldId id="265" r:id="rId24"/>
+    <p:sldId id="266" r:id="rId25"/>
   </p:sldIdLst>
   <p:sldSz cx="12192000" cy="6858000"/>
   <p:notesSz cx="6858000" cy="9144000"/>
@@ -546,7 +553,7 @@
           <a:p>
             <a:fld id="{A99F0E7E-F425-4626-BD09-9626CF101ED8}" type="slidenum">
               <a:rPr lang="en-US" smtClean="0"/>
-              <a:t>7</a:t>
+              <a:t>11</a:t>
             </a:fld>
             <a:endParaRPr lang="en-US"/>
           </a:p>
@@ -556,6 +563,90 @@
     <p:extLst>
       <p:ext uri="{BB962C8B-B14F-4D97-AF65-F5344CB8AC3E}">
         <p14:creationId xmlns:p14="http://schemas.microsoft.com/office/powerpoint/2010/main" val="1053482207"/>
+      </p:ext>
+    </p:extLst>
+  </p:cSld>
+  <p:clrMapOvr>
+    <a:masterClrMapping/>
+  </p:clrMapOvr>
+</p:notes>
+</file>
+
+<file path=ppt/notesSlides/notesSlide2.xml><?xml version="1.0" encoding="utf-8"?>
+<p:notes xmlns:a="http://schemas.openxmlformats.org/drawingml/2006/main" xmlns:r="http://schemas.openxmlformats.org/officeDocument/2006/relationships" xmlns:p="http://schemas.openxmlformats.org/presentationml/2006/main">
+  <p:cSld>
+    <p:spTree>
+      <p:nvGrpSpPr>
+        <p:cNvPr id="1" name=""/>
+        <p:cNvGrpSpPr/>
+        <p:nvPr/>
+      </p:nvGrpSpPr>
+      <p:grpSpPr>
+        <a:xfrm>
+          <a:off x="0" y="0"/>
+          <a:ext cx="0" cy="0"/>
+          <a:chOff x="0" y="0"/>
+          <a:chExt cx="0" cy="0"/>
+        </a:xfrm>
+      </p:grpSpPr>
+      <p:sp>
+        <p:nvSpPr>
+          <p:cNvPr id="2" name="Slide Image Placeholder 1"/>
+          <p:cNvSpPr>
+            <a:spLocks noGrp="1" noRot="1" noChangeAspect="1"/>
+          </p:cNvSpPr>
+          <p:nvPr>
+            <p:ph type="sldImg"/>
+          </p:nvPr>
+        </p:nvSpPr>
+        <p:spPr/>
+      </p:sp>
+      <p:sp>
+        <p:nvSpPr>
+          <p:cNvPr id="3" name="Notes Placeholder 2"/>
+          <p:cNvSpPr>
+            <a:spLocks noGrp="1"/>
+          </p:cNvSpPr>
+          <p:nvPr>
+            <p:ph type="body" idx="1"/>
+          </p:nvPr>
+        </p:nvSpPr>
+        <p:spPr/>
+        <p:txBody>
+          <a:bodyPr/>
+          <a:lstStyle/>
+          <a:p>
+            <a:endParaRPr lang="en-US" dirty="0"/>
+          </a:p>
+        </p:txBody>
+      </p:sp>
+      <p:sp>
+        <p:nvSpPr>
+          <p:cNvPr id="4" name="Slide Number Placeholder 3"/>
+          <p:cNvSpPr>
+            <a:spLocks noGrp="1"/>
+          </p:cNvSpPr>
+          <p:nvPr>
+            <p:ph type="sldNum" sz="quarter" idx="10"/>
+          </p:nvPr>
+        </p:nvSpPr>
+        <p:spPr/>
+        <p:txBody>
+          <a:bodyPr/>
+          <a:lstStyle/>
+          <a:p>
+            <a:fld id="{A99F0E7E-F425-4626-BD09-9626CF101ED8}" type="slidenum">
+              <a:rPr lang="en-US" smtClean="0"/>
+              <a:t>21</a:t>
+            </a:fld>
+            <a:endParaRPr lang="en-US"/>
+          </a:p>
+        </p:txBody>
+      </p:sp>
+    </p:spTree>
+    <p:extLst>
+      <p:ext uri="{BB962C8B-B14F-4D97-AF65-F5344CB8AC3E}">
+        <p14:creationId xmlns:p14="http://schemas.microsoft.com/office/powerpoint/2010/main" val="782588132"/>
       </p:ext>
     </p:extLst>
   </p:cSld>
@@ -3491,737 +3582,6 @@
       </p:grpSpPr>
       <p:pic>
         <p:nvPicPr>
-          <p:cNvPr id="2" name="Picture 1"/>
-          <p:cNvPicPr>
-            <a:picLocks noChangeAspect="1"/>
-          </p:cNvPicPr>
-          <p:nvPr/>
-        </p:nvPicPr>
-        <p:blipFill>
-          <a:blip r:embed="rId2">
-            <a:extLst>
-              <a:ext uri="{28A0092B-C50C-407E-A947-70E740481C1C}">
-                <a14:useLocalDpi xmlns:a14="http://schemas.microsoft.com/office/drawing/2010/main" val="0"/>
-              </a:ext>
-            </a:extLst>
-          </a:blip>
-          <a:stretch>
-            <a:fillRect/>
-          </a:stretch>
-        </p:blipFill>
-        <p:spPr>
-          <a:xfrm>
-            <a:off x="365283" y="0"/>
-            <a:ext cx="11461433" cy="6858000"/>
-          </a:xfrm>
-          <a:prstGeom prst="rect">
-            <a:avLst/>
-          </a:prstGeom>
-        </p:spPr>
-      </p:pic>
-    </p:spTree>
-    <p:extLst>
-      <p:ext uri="{BB962C8B-B14F-4D97-AF65-F5344CB8AC3E}">
-        <p14:creationId xmlns:p14="http://schemas.microsoft.com/office/powerpoint/2010/main" val="2267080489"/>
-      </p:ext>
-    </p:extLst>
-  </p:cSld>
-  <p:clrMapOvr>
-    <a:masterClrMapping/>
-  </p:clrMapOvr>
-  <p:timing>
-    <p:tnLst>
-      <p:par>
-        <p:cTn id="1" dur="indefinite" restart="never" nodeType="tmRoot"/>
-      </p:par>
-    </p:tnLst>
-  </p:timing>
-</p:sld>
-</file>
-
-<file path=ppt/slides/slide11.xml><?xml version="1.0" encoding="utf-8"?>
-<p:sld xmlns:a="http://schemas.openxmlformats.org/drawingml/2006/main" xmlns:r="http://schemas.openxmlformats.org/officeDocument/2006/relationships" xmlns:p="http://schemas.openxmlformats.org/presentationml/2006/main">
-  <p:cSld>
-    <p:spTree>
-      <p:nvGrpSpPr>
-        <p:cNvPr id="1" name=""/>
-        <p:cNvGrpSpPr/>
-        <p:nvPr/>
-      </p:nvGrpSpPr>
-      <p:grpSpPr>
-        <a:xfrm>
-          <a:off x="0" y="0"/>
-          <a:ext cx="0" cy="0"/>
-          <a:chOff x="0" y="0"/>
-          <a:chExt cx="0" cy="0"/>
-        </a:xfrm>
-      </p:grpSpPr>
-      <p:pic>
-        <p:nvPicPr>
-          <p:cNvPr id="4" name="Picture 3"/>
-          <p:cNvPicPr>
-            <a:picLocks noChangeAspect="1"/>
-          </p:cNvPicPr>
-          <p:nvPr/>
-        </p:nvPicPr>
-        <p:blipFill>
-          <a:blip r:embed="rId2">
-            <a:extLst>
-              <a:ext uri="{28A0092B-C50C-407E-A947-70E740481C1C}">
-                <a14:useLocalDpi xmlns:a14="http://schemas.microsoft.com/office/drawing/2010/main" val="0"/>
-              </a:ext>
-            </a:extLst>
-          </a:blip>
-          <a:stretch>
-            <a:fillRect/>
-          </a:stretch>
-        </p:blipFill>
-        <p:spPr>
-          <a:xfrm>
-            <a:off x="43770" y="0"/>
-            <a:ext cx="12104460" cy="6858000"/>
-          </a:xfrm>
-          <a:prstGeom prst="rect">
-            <a:avLst/>
-          </a:prstGeom>
-        </p:spPr>
-      </p:pic>
-    </p:spTree>
-    <p:extLst>
-      <p:ext uri="{BB962C8B-B14F-4D97-AF65-F5344CB8AC3E}">
-        <p14:creationId xmlns:p14="http://schemas.microsoft.com/office/powerpoint/2010/main" val="3530938608"/>
-      </p:ext>
-    </p:extLst>
-  </p:cSld>
-  <p:clrMapOvr>
-    <a:masterClrMapping/>
-  </p:clrMapOvr>
-</p:sld>
-</file>
-
-<file path=ppt/slides/slide12.xml><?xml version="1.0" encoding="utf-8"?>
-<p:sld xmlns:a="http://schemas.openxmlformats.org/drawingml/2006/main" xmlns:r="http://schemas.openxmlformats.org/officeDocument/2006/relationships" xmlns:p="http://schemas.openxmlformats.org/presentationml/2006/main">
-  <p:cSld>
-    <p:spTree>
-      <p:nvGrpSpPr>
-        <p:cNvPr id="1" name=""/>
-        <p:cNvGrpSpPr/>
-        <p:nvPr/>
-      </p:nvGrpSpPr>
-      <p:grpSpPr>
-        <a:xfrm>
-          <a:off x="0" y="0"/>
-          <a:ext cx="0" cy="0"/>
-          <a:chOff x="0" y="0"/>
-          <a:chExt cx="0" cy="0"/>
-        </a:xfrm>
-      </p:grpSpPr>
-      <p:pic>
-        <p:nvPicPr>
-          <p:cNvPr id="3" name="Content Placeholder 2"/>
-          <p:cNvPicPr>
-            <a:picLocks noGrp="1" noChangeAspect="1"/>
-          </p:cNvPicPr>
-          <p:nvPr>
-            <p:ph idx="1"/>
-          </p:nvPr>
-        </p:nvPicPr>
-        <p:blipFill>
-          <a:blip r:embed="rId2">
-            <a:extLst>
-              <a:ext uri="{28A0092B-C50C-407E-A947-70E740481C1C}">
-                <a14:useLocalDpi xmlns:a14="http://schemas.microsoft.com/office/drawing/2010/main" val="0"/>
-              </a:ext>
-            </a:extLst>
-          </a:blip>
-          <a:stretch>
-            <a:fillRect/>
-          </a:stretch>
-        </p:blipFill>
-        <p:spPr>
-          <a:xfrm>
-            <a:off x="198741" y="383177"/>
-            <a:ext cx="11366242" cy="6078585"/>
-          </a:xfrm>
-        </p:spPr>
-      </p:pic>
-    </p:spTree>
-    <p:extLst>
-      <p:ext uri="{BB962C8B-B14F-4D97-AF65-F5344CB8AC3E}">
-        <p14:creationId xmlns:p14="http://schemas.microsoft.com/office/powerpoint/2010/main" val="484080383"/>
-      </p:ext>
-    </p:extLst>
-  </p:cSld>
-  <p:clrMapOvr>
-    <a:masterClrMapping/>
-  </p:clrMapOvr>
-  <p:timing>
-    <p:tnLst>
-      <p:par>
-        <p:cTn id="1" dur="indefinite" restart="never" nodeType="tmRoot"/>
-      </p:par>
-    </p:tnLst>
-  </p:timing>
-</p:sld>
-</file>
-
-<file path=ppt/slides/slide13.xml><?xml version="1.0" encoding="utf-8"?>
-<p:sld xmlns:a="http://schemas.openxmlformats.org/drawingml/2006/main" xmlns:r="http://schemas.openxmlformats.org/officeDocument/2006/relationships" xmlns:p="http://schemas.openxmlformats.org/presentationml/2006/main">
-  <p:cSld>
-    <p:spTree>
-      <p:nvGrpSpPr>
-        <p:cNvPr id="1" name=""/>
-        <p:cNvGrpSpPr/>
-        <p:nvPr/>
-      </p:nvGrpSpPr>
-      <p:grpSpPr>
-        <a:xfrm>
-          <a:off x="0" y="0"/>
-          <a:ext cx="0" cy="0"/>
-          <a:chOff x="0" y="0"/>
-          <a:chExt cx="0" cy="0"/>
-        </a:xfrm>
-      </p:grpSpPr>
-      <p:pic>
-        <p:nvPicPr>
-          <p:cNvPr id="2" name="Picture 1"/>
-          <p:cNvPicPr>
-            <a:picLocks noChangeAspect="1"/>
-          </p:cNvPicPr>
-          <p:nvPr/>
-        </p:nvPicPr>
-        <p:blipFill>
-          <a:blip r:embed="rId2">
-            <a:extLst>
-              <a:ext uri="{28A0092B-C50C-407E-A947-70E740481C1C}">
-                <a14:useLocalDpi xmlns:a14="http://schemas.microsoft.com/office/drawing/2010/main" val="0"/>
-              </a:ext>
-            </a:extLst>
-          </a:blip>
-          <a:stretch>
-            <a:fillRect/>
-          </a:stretch>
-        </p:blipFill>
-        <p:spPr>
-          <a:xfrm>
-            <a:off x="0" y="512518"/>
-            <a:ext cx="12192000" cy="5832963"/>
-          </a:xfrm>
-          <a:prstGeom prst="rect">
-            <a:avLst/>
-          </a:prstGeom>
-        </p:spPr>
-      </p:pic>
-    </p:spTree>
-    <p:extLst>
-      <p:ext uri="{BB962C8B-B14F-4D97-AF65-F5344CB8AC3E}">
-        <p14:creationId xmlns:p14="http://schemas.microsoft.com/office/powerpoint/2010/main" val="13892366"/>
-      </p:ext>
-    </p:extLst>
-  </p:cSld>
-  <p:clrMapOvr>
-    <a:masterClrMapping/>
-  </p:clrMapOvr>
-</p:sld>
-</file>
-
-<file path=ppt/slides/slide14.xml><?xml version="1.0" encoding="utf-8"?>
-<p:sld xmlns:a="http://schemas.openxmlformats.org/drawingml/2006/main" xmlns:r="http://schemas.openxmlformats.org/officeDocument/2006/relationships" xmlns:p="http://schemas.openxmlformats.org/presentationml/2006/main">
-  <p:cSld>
-    <p:spTree>
-      <p:nvGrpSpPr>
-        <p:cNvPr id="1" name=""/>
-        <p:cNvGrpSpPr/>
-        <p:nvPr/>
-      </p:nvGrpSpPr>
-      <p:grpSpPr>
-        <a:xfrm>
-          <a:off x="0" y="0"/>
-          <a:ext cx="0" cy="0"/>
-          <a:chOff x="0" y="0"/>
-          <a:chExt cx="0" cy="0"/>
-        </a:xfrm>
-      </p:grpSpPr>
-      <p:pic>
-        <p:nvPicPr>
-          <p:cNvPr id="4" name="Content Placeholder 3"/>
-          <p:cNvPicPr>
-            <a:picLocks noGrp="1" noChangeAspect="1"/>
-          </p:cNvPicPr>
-          <p:nvPr>
-            <p:ph idx="1"/>
-          </p:nvPr>
-        </p:nvPicPr>
-        <p:blipFill>
-          <a:blip r:embed="rId2">
-            <a:extLst>
-              <a:ext uri="{28A0092B-C50C-407E-A947-70E740481C1C}">
-                <a14:useLocalDpi xmlns:a14="http://schemas.microsoft.com/office/drawing/2010/main" val="0"/>
-              </a:ext>
-            </a:extLst>
-          </a:blip>
-          <a:stretch>
-            <a:fillRect/>
-          </a:stretch>
-        </p:blipFill>
-        <p:spPr>
-          <a:xfrm>
-            <a:off x="581518" y="48302"/>
-            <a:ext cx="11102482" cy="6531431"/>
-          </a:xfrm>
-        </p:spPr>
-      </p:pic>
-    </p:spTree>
-    <p:extLst>
-      <p:ext uri="{BB962C8B-B14F-4D97-AF65-F5344CB8AC3E}">
-        <p14:creationId xmlns:p14="http://schemas.microsoft.com/office/powerpoint/2010/main" val="1615379028"/>
-      </p:ext>
-    </p:extLst>
-  </p:cSld>
-  <p:clrMapOvr>
-    <a:masterClrMapping/>
-  </p:clrMapOvr>
-</p:sld>
-</file>
-
-<file path=ppt/slides/slide15.xml><?xml version="1.0" encoding="utf-8"?>
-<p:sld xmlns:a="http://schemas.openxmlformats.org/drawingml/2006/main" xmlns:r="http://schemas.openxmlformats.org/officeDocument/2006/relationships" xmlns:p="http://schemas.openxmlformats.org/presentationml/2006/main">
-  <p:cSld>
-    <p:spTree>
-      <p:nvGrpSpPr>
-        <p:cNvPr id="1" name=""/>
-        <p:cNvGrpSpPr/>
-        <p:nvPr/>
-      </p:nvGrpSpPr>
-      <p:grpSpPr>
-        <a:xfrm>
-          <a:off x="0" y="0"/>
-          <a:ext cx="0" cy="0"/>
-          <a:chOff x="0" y="0"/>
-          <a:chExt cx="0" cy="0"/>
-        </a:xfrm>
-      </p:grpSpPr>
-      <p:pic>
-        <p:nvPicPr>
-          <p:cNvPr id="4" name="Picture 3"/>
-          <p:cNvPicPr>
-            <a:picLocks noChangeAspect="1"/>
-          </p:cNvPicPr>
-          <p:nvPr/>
-        </p:nvPicPr>
-        <p:blipFill>
-          <a:blip r:embed="rId2">
-            <a:extLst>
-              <a:ext uri="{28A0092B-C50C-407E-A947-70E740481C1C}">
-                <a14:useLocalDpi xmlns:a14="http://schemas.microsoft.com/office/drawing/2010/main" val="0"/>
-              </a:ext>
-            </a:extLst>
-          </a:blip>
-          <a:stretch>
-            <a:fillRect/>
-          </a:stretch>
-        </p:blipFill>
-        <p:spPr>
-          <a:xfrm>
-            <a:off x="119062" y="100012"/>
-            <a:ext cx="12067112" cy="6757988"/>
-          </a:xfrm>
-          <a:prstGeom prst="rect">
-            <a:avLst/>
-          </a:prstGeom>
-        </p:spPr>
-      </p:pic>
-    </p:spTree>
-    <p:extLst>
-      <p:ext uri="{BB962C8B-B14F-4D97-AF65-F5344CB8AC3E}">
-        <p14:creationId xmlns:p14="http://schemas.microsoft.com/office/powerpoint/2010/main" val="2137163140"/>
-      </p:ext>
-    </p:extLst>
-  </p:cSld>
-  <p:clrMapOvr>
-    <a:masterClrMapping/>
-  </p:clrMapOvr>
-</p:sld>
-</file>
-
-<file path=ppt/slides/slide16.xml><?xml version="1.0" encoding="utf-8"?>
-<p:sld xmlns:a="http://schemas.openxmlformats.org/drawingml/2006/main" xmlns:r="http://schemas.openxmlformats.org/officeDocument/2006/relationships" xmlns:p="http://schemas.openxmlformats.org/presentationml/2006/main">
-  <p:cSld>
-    <p:spTree>
-      <p:nvGrpSpPr>
-        <p:cNvPr id="1" name=""/>
-        <p:cNvGrpSpPr/>
-        <p:nvPr/>
-      </p:nvGrpSpPr>
-      <p:grpSpPr>
-        <a:xfrm>
-          <a:off x="0" y="0"/>
-          <a:ext cx="0" cy="0"/>
-          <a:chOff x="0" y="0"/>
-          <a:chExt cx="0" cy="0"/>
-        </a:xfrm>
-      </p:grpSpPr>
-      <p:pic>
-        <p:nvPicPr>
-          <p:cNvPr id="3" name="Content Placeholder 2"/>
-          <p:cNvPicPr>
-            <a:picLocks noGrp="1" noChangeAspect="1"/>
-          </p:cNvPicPr>
-          <p:nvPr>
-            <p:ph idx="1"/>
-          </p:nvPr>
-        </p:nvPicPr>
-        <p:blipFill>
-          <a:blip r:embed="rId2">
-            <a:extLst>
-              <a:ext uri="{28A0092B-C50C-407E-A947-70E740481C1C}">
-                <a14:useLocalDpi xmlns:a14="http://schemas.microsoft.com/office/drawing/2010/main" val="0"/>
-              </a:ext>
-            </a:extLst>
-          </a:blip>
-          <a:stretch>
-            <a:fillRect/>
-          </a:stretch>
-        </p:blipFill>
-        <p:spPr>
-          <a:xfrm>
-            <a:off x="-15240" y="661851"/>
-            <a:ext cx="12207240" cy="5529943"/>
-          </a:xfrm>
-        </p:spPr>
-      </p:pic>
-    </p:spTree>
-    <p:extLst>
-      <p:ext uri="{BB962C8B-B14F-4D97-AF65-F5344CB8AC3E}">
-        <p14:creationId xmlns:p14="http://schemas.microsoft.com/office/powerpoint/2010/main" val="2273175920"/>
-      </p:ext>
-    </p:extLst>
-  </p:cSld>
-  <p:clrMapOvr>
-    <a:masterClrMapping/>
-  </p:clrMapOvr>
-</p:sld>
-</file>
-
-<file path=ppt/slides/slide17.xml><?xml version="1.0" encoding="utf-8"?>
-<p:sld xmlns:a="http://schemas.openxmlformats.org/drawingml/2006/main" xmlns:r="http://schemas.openxmlformats.org/officeDocument/2006/relationships" xmlns:p="http://schemas.openxmlformats.org/presentationml/2006/main">
-  <p:cSld>
-    <p:spTree>
-      <p:nvGrpSpPr>
-        <p:cNvPr id="1" name=""/>
-        <p:cNvGrpSpPr/>
-        <p:nvPr/>
-      </p:nvGrpSpPr>
-      <p:grpSpPr>
-        <a:xfrm>
-          <a:off x="0" y="0"/>
-          <a:ext cx="0" cy="0"/>
-          <a:chOff x="0" y="0"/>
-          <a:chExt cx="0" cy="0"/>
-        </a:xfrm>
-      </p:grpSpPr>
-      <p:pic>
-        <p:nvPicPr>
-          <p:cNvPr id="3" name="Picture 2"/>
-          <p:cNvPicPr>
-            <a:picLocks noChangeAspect="1"/>
-          </p:cNvPicPr>
-          <p:nvPr/>
-        </p:nvPicPr>
-        <p:blipFill>
-          <a:blip r:embed="rId2">
-            <a:extLst>
-              <a:ext uri="{28A0092B-C50C-407E-A947-70E740481C1C}">
-                <a14:useLocalDpi xmlns:a14="http://schemas.microsoft.com/office/drawing/2010/main" val="0"/>
-              </a:ext>
-            </a:extLst>
-          </a:blip>
-          <a:stretch>
-            <a:fillRect/>
-          </a:stretch>
-        </p:blipFill>
-        <p:spPr>
-          <a:xfrm>
-            <a:off x="679949" y="380047"/>
-            <a:ext cx="10902451" cy="6216402"/>
-          </a:xfrm>
-          <a:prstGeom prst="rect">
-            <a:avLst/>
-          </a:prstGeom>
-        </p:spPr>
-      </p:pic>
-    </p:spTree>
-    <p:extLst>
-      <p:ext uri="{BB962C8B-B14F-4D97-AF65-F5344CB8AC3E}">
-        <p14:creationId xmlns:p14="http://schemas.microsoft.com/office/powerpoint/2010/main" val="1846852608"/>
-      </p:ext>
-    </p:extLst>
-  </p:cSld>
-  <p:clrMapOvr>
-    <a:masterClrMapping/>
-  </p:clrMapOvr>
-</p:sld>
-</file>
-
-<file path=ppt/slides/slide2.xml><?xml version="1.0" encoding="utf-8"?>
-<p:sld xmlns:a="http://schemas.openxmlformats.org/drawingml/2006/main" xmlns:r="http://schemas.openxmlformats.org/officeDocument/2006/relationships" xmlns:p="http://schemas.openxmlformats.org/presentationml/2006/main">
-  <p:cSld>
-    <p:spTree>
-      <p:nvGrpSpPr>
-        <p:cNvPr id="1" name=""/>
-        <p:cNvGrpSpPr/>
-        <p:nvPr/>
-      </p:nvGrpSpPr>
-      <p:grpSpPr>
-        <a:xfrm>
-          <a:off x="0" y="0"/>
-          <a:ext cx="0" cy="0"/>
-          <a:chOff x="0" y="0"/>
-          <a:chExt cx="0" cy="0"/>
-        </a:xfrm>
-      </p:grpSpPr>
-      <p:pic>
-        <p:nvPicPr>
-          <p:cNvPr id="4" name="Picture 3"/>
-          <p:cNvPicPr>
-            <a:picLocks noChangeAspect="1"/>
-          </p:cNvPicPr>
-          <p:nvPr/>
-        </p:nvPicPr>
-        <p:blipFill>
-          <a:blip r:embed="rId2">
-            <a:extLst>
-              <a:ext uri="{28A0092B-C50C-407E-A947-70E740481C1C}">
-                <a14:useLocalDpi xmlns:a14="http://schemas.microsoft.com/office/drawing/2010/main" val="0"/>
-              </a:ext>
-            </a:extLst>
-          </a:blip>
-          <a:stretch>
-            <a:fillRect/>
-          </a:stretch>
-        </p:blipFill>
-        <p:spPr>
-          <a:xfrm>
-            <a:off x="0" y="331787"/>
-            <a:ext cx="12079129" cy="6526213"/>
-          </a:xfrm>
-          <a:prstGeom prst="rect">
-            <a:avLst/>
-          </a:prstGeom>
-        </p:spPr>
-      </p:pic>
-    </p:spTree>
-    <p:extLst>
-      <p:ext uri="{BB962C8B-B14F-4D97-AF65-F5344CB8AC3E}">
-        <p14:creationId xmlns:p14="http://schemas.microsoft.com/office/powerpoint/2010/main" val="28290632"/>
-      </p:ext>
-    </p:extLst>
-  </p:cSld>
-  <p:clrMapOvr>
-    <a:masterClrMapping/>
-  </p:clrMapOvr>
-</p:sld>
-</file>
-
-<file path=ppt/slides/slide3.xml><?xml version="1.0" encoding="utf-8"?>
-<p:sld xmlns:a="http://schemas.openxmlformats.org/drawingml/2006/main" xmlns:r="http://schemas.openxmlformats.org/officeDocument/2006/relationships" xmlns:p="http://schemas.openxmlformats.org/presentationml/2006/main">
-  <p:cSld>
-    <p:spTree>
-      <p:nvGrpSpPr>
-        <p:cNvPr id="1" name=""/>
-        <p:cNvGrpSpPr/>
-        <p:nvPr/>
-      </p:nvGrpSpPr>
-      <p:grpSpPr>
-        <a:xfrm>
-          <a:off x="0" y="0"/>
-          <a:ext cx="0" cy="0"/>
-          <a:chOff x="0" y="0"/>
-          <a:chExt cx="0" cy="0"/>
-        </a:xfrm>
-      </p:grpSpPr>
-      <p:pic>
-        <p:nvPicPr>
-          <p:cNvPr id="4" name="Picture 3"/>
-          <p:cNvPicPr>
-            <a:picLocks noChangeAspect="1"/>
-          </p:cNvPicPr>
-          <p:nvPr/>
-        </p:nvPicPr>
-        <p:blipFill>
-          <a:blip r:embed="rId2">
-            <a:extLst>
-              <a:ext uri="{28A0092B-C50C-407E-A947-70E740481C1C}">
-                <a14:useLocalDpi xmlns:a14="http://schemas.microsoft.com/office/drawing/2010/main" val="0"/>
-              </a:ext>
-            </a:extLst>
-          </a:blip>
-          <a:stretch>
-            <a:fillRect/>
-          </a:stretch>
-        </p:blipFill>
-        <p:spPr>
-          <a:xfrm>
-            <a:off x="-1" y="238124"/>
-            <a:ext cx="11928475" cy="6315075"/>
-          </a:xfrm>
-          <a:prstGeom prst="rect">
-            <a:avLst/>
-          </a:prstGeom>
-        </p:spPr>
-      </p:pic>
-    </p:spTree>
-    <p:extLst>
-      <p:ext uri="{BB962C8B-B14F-4D97-AF65-F5344CB8AC3E}">
-        <p14:creationId xmlns:p14="http://schemas.microsoft.com/office/powerpoint/2010/main" val="1886599859"/>
-      </p:ext>
-    </p:extLst>
-  </p:cSld>
-  <p:clrMapOvr>
-    <a:masterClrMapping/>
-  </p:clrMapOvr>
-</p:sld>
-</file>
-
-<file path=ppt/slides/slide4.xml><?xml version="1.0" encoding="utf-8"?>
-<p:sld xmlns:a="http://schemas.openxmlformats.org/drawingml/2006/main" xmlns:r="http://schemas.openxmlformats.org/officeDocument/2006/relationships" xmlns:p="http://schemas.openxmlformats.org/presentationml/2006/main">
-  <p:cSld>
-    <p:spTree>
-      <p:nvGrpSpPr>
-        <p:cNvPr id="1" name=""/>
-        <p:cNvGrpSpPr/>
-        <p:nvPr/>
-      </p:nvGrpSpPr>
-      <p:grpSpPr>
-        <a:xfrm>
-          <a:off x="0" y="0"/>
-          <a:ext cx="0" cy="0"/>
-          <a:chOff x="0" y="0"/>
-          <a:chExt cx="0" cy="0"/>
-        </a:xfrm>
-      </p:grpSpPr>
-      <p:pic>
-        <p:nvPicPr>
-          <p:cNvPr id="4" name="Picture 3"/>
-          <p:cNvPicPr>
-            <a:picLocks noChangeAspect="1"/>
-          </p:cNvPicPr>
-          <p:nvPr/>
-        </p:nvPicPr>
-        <p:blipFill>
-          <a:blip r:embed="rId2">
-            <a:extLst>
-              <a:ext uri="{28A0092B-C50C-407E-A947-70E740481C1C}">
-                <a14:useLocalDpi xmlns:a14="http://schemas.microsoft.com/office/drawing/2010/main" val="0"/>
-              </a:ext>
-            </a:extLst>
-          </a:blip>
-          <a:stretch>
-            <a:fillRect/>
-          </a:stretch>
-        </p:blipFill>
-        <p:spPr>
-          <a:xfrm>
-            <a:off x="0" y="384175"/>
-            <a:ext cx="12365618" cy="6473825"/>
-          </a:xfrm>
-          <a:prstGeom prst="rect">
-            <a:avLst/>
-          </a:prstGeom>
-        </p:spPr>
-      </p:pic>
-    </p:spTree>
-    <p:extLst>
-      <p:ext uri="{BB962C8B-B14F-4D97-AF65-F5344CB8AC3E}">
-        <p14:creationId xmlns:p14="http://schemas.microsoft.com/office/powerpoint/2010/main" val="3646351307"/>
-      </p:ext>
-    </p:extLst>
-  </p:cSld>
-  <p:clrMapOvr>
-    <a:masterClrMapping/>
-  </p:clrMapOvr>
-</p:sld>
-</file>
-
-<file path=ppt/slides/slide5.xml><?xml version="1.0" encoding="utf-8"?>
-<p:sld xmlns:a="http://schemas.openxmlformats.org/drawingml/2006/main" xmlns:r="http://schemas.openxmlformats.org/officeDocument/2006/relationships" xmlns:p="http://schemas.openxmlformats.org/presentationml/2006/main">
-  <p:cSld>
-    <p:spTree>
-      <p:nvGrpSpPr>
-        <p:cNvPr id="1" name=""/>
-        <p:cNvGrpSpPr/>
-        <p:nvPr/>
-      </p:nvGrpSpPr>
-      <p:grpSpPr>
-        <a:xfrm>
-          <a:off x="0" y="0"/>
-          <a:ext cx="0" cy="0"/>
-          <a:chOff x="0" y="0"/>
-          <a:chExt cx="0" cy="0"/>
-        </a:xfrm>
-      </p:grpSpPr>
-      <p:pic>
-        <p:nvPicPr>
-          <p:cNvPr id="5" name="Picture 4"/>
-          <p:cNvPicPr>
-            <a:picLocks noChangeAspect="1"/>
-          </p:cNvPicPr>
-          <p:nvPr/>
-        </p:nvPicPr>
-        <p:blipFill>
-          <a:blip r:embed="rId2">
-            <a:extLst>
-              <a:ext uri="{28A0092B-C50C-407E-A947-70E740481C1C}">
-                <a14:useLocalDpi xmlns:a14="http://schemas.microsoft.com/office/drawing/2010/main" val="0"/>
-              </a:ext>
-            </a:extLst>
-          </a:blip>
-          <a:stretch>
-            <a:fillRect/>
-          </a:stretch>
-        </p:blipFill>
-        <p:spPr>
-          <a:xfrm>
-            <a:off x="257846" y="270457"/>
-            <a:ext cx="12298014" cy="6014433"/>
-          </a:xfrm>
-          <a:prstGeom prst="rect">
-            <a:avLst/>
-          </a:prstGeom>
-        </p:spPr>
-      </p:pic>
-    </p:spTree>
-    <p:extLst>
-      <p:ext uri="{BB962C8B-B14F-4D97-AF65-F5344CB8AC3E}">
-        <p14:creationId xmlns:p14="http://schemas.microsoft.com/office/powerpoint/2010/main" val="3180700977"/>
-      </p:ext>
-    </p:extLst>
-  </p:cSld>
-  <p:clrMapOvr>
-    <a:masterClrMapping/>
-  </p:clrMapOvr>
-</p:sld>
-</file>
-
-<file path=ppt/slides/slide6.xml><?xml version="1.0" encoding="utf-8"?>
-<p:sld xmlns:a="http://schemas.openxmlformats.org/drawingml/2006/main" xmlns:r="http://schemas.openxmlformats.org/officeDocument/2006/relationships" xmlns:p="http://schemas.openxmlformats.org/presentationml/2006/main">
-  <p:cSld>
-    <p:spTree>
-      <p:nvGrpSpPr>
-        <p:cNvPr id="1" name=""/>
-        <p:cNvGrpSpPr/>
-        <p:nvPr/>
-      </p:nvGrpSpPr>
-      <p:grpSpPr>
-        <a:xfrm>
-          <a:off x="0" y="0"/>
-          <a:ext cx="0" cy="0"/>
-          <a:chOff x="0" y="0"/>
-          <a:chExt cx="0" cy="0"/>
-        </a:xfrm>
-      </p:grpSpPr>
-      <p:pic>
-        <p:nvPicPr>
           <p:cNvPr id="4" name="Picture 3"/>
           <p:cNvPicPr>
             <a:picLocks noChangeAspect="1"/>
@@ -4263,7 +3623,7 @@
 </p:sld>
 </file>
 
-<file path=ppt/slides/slide7.xml><?xml version="1.0" encoding="utf-8"?>
+<file path=ppt/slides/slide11.xml><?xml version="1.0" encoding="utf-8"?>
 <p:sld xmlns:a="http://schemas.openxmlformats.org/drawingml/2006/main" xmlns:r="http://schemas.openxmlformats.org/officeDocument/2006/relationships" xmlns:p="http://schemas.openxmlformats.org/presentationml/2006/main">
   <p:cSld>
     <p:spTree>
@@ -4323,7 +3683,7 @@
 </p:sld>
 </file>
 
-<file path=ppt/slides/slide8.xml><?xml version="1.0" encoding="utf-8"?>
+<file path=ppt/slides/slide12.xml><?xml version="1.0" encoding="utf-8"?>
 <p:sld xmlns:a="http://schemas.openxmlformats.org/drawingml/2006/main" xmlns:r="http://schemas.openxmlformats.org/officeDocument/2006/relationships" xmlns:p="http://schemas.openxmlformats.org/presentationml/2006/main">
   <p:cSld>
     <p:spTree>
@@ -4390,7 +3750,7 @@
 </p:sld>
 </file>
 
-<file path=ppt/slides/slide9.xml><?xml version="1.0" encoding="utf-8"?>
+<file path=ppt/slides/slide13.xml><?xml version="1.0" encoding="utf-8"?>
 <p:sld xmlns:a="http://schemas.openxmlformats.org/drawingml/2006/main" xmlns:r="http://schemas.openxmlformats.org/officeDocument/2006/relationships" xmlns:p="http://schemas.openxmlformats.org/presentationml/2006/main">
   <p:cSld>
     <p:spTree>
@@ -4454,6 +3814,1253 @@
       </p:par>
     </p:tnLst>
   </p:timing>
+</p:sld>
+</file>
+
+<file path=ppt/slides/slide14.xml><?xml version="1.0" encoding="utf-8"?>
+<p:sld xmlns:a="http://schemas.openxmlformats.org/drawingml/2006/main" xmlns:r="http://schemas.openxmlformats.org/officeDocument/2006/relationships" xmlns:p="http://schemas.openxmlformats.org/presentationml/2006/main">
+  <p:cSld>
+    <p:spTree>
+      <p:nvGrpSpPr>
+        <p:cNvPr id="1" name=""/>
+        <p:cNvGrpSpPr/>
+        <p:nvPr/>
+      </p:nvGrpSpPr>
+      <p:grpSpPr>
+        <a:xfrm>
+          <a:off x="0" y="0"/>
+          <a:ext cx="0" cy="0"/>
+          <a:chOff x="0" y="0"/>
+          <a:chExt cx="0" cy="0"/>
+        </a:xfrm>
+      </p:grpSpPr>
+      <p:pic>
+        <p:nvPicPr>
+          <p:cNvPr id="2" name="Picture 1"/>
+          <p:cNvPicPr>
+            <a:picLocks noChangeAspect="1"/>
+          </p:cNvPicPr>
+          <p:nvPr/>
+        </p:nvPicPr>
+        <p:blipFill>
+          <a:blip r:embed="rId2">
+            <a:extLst>
+              <a:ext uri="{28A0092B-C50C-407E-A947-70E740481C1C}">
+                <a14:useLocalDpi xmlns:a14="http://schemas.microsoft.com/office/drawing/2010/main" val="0"/>
+              </a:ext>
+            </a:extLst>
+          </a:blip>
+          <a:stretch>
+            <a:fillRect/>
+          </a:stretch>
+        </p:blipFill>
+        <p:spPr>
+          <a:xfrm>
+            <a:off x="365283" y="0"/>
+            <a:ext cx="11461433" cy="6858000"/>
+          </a:xfrm>
+          <a:prstGeom prst="rect">
+            <a:avLst/>
+          </a:prstGeom>
+        </p:spPr>
+      </p:pic>
+    </p:spTree>
+    <p:extLst>
+      <p:ext uri="{BB962C8B-B14F-4D97-AF65-F5344CB8AC3E}">
+        <p14:creationId xmlns:p14="http://schemas.microsoft.com/office/powerpoint/2010/main" val="2267080489"/>
+      </p:ext>
+    </p:extLst>
+  </p:cSld>
+  <p:clrMapOvr>
+    <a:masterClrMapping/>
+  </p:clrMapOvr>
+  <p:timing>
+    <p:tnLst>
+      <p:par>
+        <p:cTn id="1" dur="indefinite" restart="never" nodeType="tmRoot"/>
+      </p:par>
+    </p:tnLst>
+  </p:timing>
+</p:sld>
+</file>
+
+<file path=ppt/slides/slide15.xml><?xml version="1.0" encoding="utf-8"?>
+<p:sld xmlns:a="http://schemas.openxmlformats.org/drawingml/2006/main" xmlns:r="http://schemas.openxmlformats.org/officeDocument/2006/relationships" xmlns:p="http://schemas.openxmlformats.org/presentationml/2006/main">
+  <p:cSld>
+    <p:spTree>
+      <p:nvGrpSpPr>
+        <p:cNvPr id="1" name=""/>
+        <p:cNvGrpSpPr/>
+        <p:nvPr/>
+      </p:nvGrpSpPr>
+      <p:grpSpPr>
+        <a:xfrm>
+          <a:off x="0" y="0"/>
+          <a:ext cx="0" cy="0"/>
+          <a:chOff x="0" y="0"/>
+          <a:chExt cx="0" cy="0"/>
+        </a:xfrm>
+      </p:grpSpPr>
+      <p:pic>
+        <p:nvPicPr>
+          <p:cNvPr id="4" name="Picture 3"/>
+          <p:cNvPicPr>
+            <a:picLocks noChangeAspect="1"/>
+          </p:cNvPicPr>
+          <p:nvPr/>
+        </p:nvPicPr>
+        <p:blipFill>
+          <a:blip r:embed="rId2">
+            <a:extLst>
+              <a:ext uri="{28A0092B-C50C-407E-A947-70E740481C1C}">
+                <a14:useLocalDpi xmlns:a14="http://schemas.microsoft.com/office/drawing/2010/main" val="0"/>
+              </a:ext>
+            </a:extLst>
+          </a:blip>
+          <a:stretch>
+            <a:fillRect/>
+          </a:stretch>
+        </p:blipFill>
+        <p:spPr>
+          <a:xfrm>
+            <a:off x="43770" y="0"/>
+            <a:ext cx="12104460" cy="6858000"/>
+          </a:xfrm>
+          <a:prstGeom prst="rect">
+            <a:avLst/>
+          </a:prstGeom>
+        </p:spPr>
+      </p:pic>
+    </p:spTree>
+    <p:extLst>
+      <p:ext uri="{BB962C8B-B14F-4D97-AF65-F5344CB8AC3E}">
+        <p14:creationId xmlns:p14="http://schemas.microsoft.com/office/powerpoint/2010/main" val="3530938608"/>
+      </p:ext>
+    </p:extLst>
+  </p:cSld>
+  <p:clrMapOvr>
+    <a:masterClrMapping/>
+  </p:clrMapOvr>
+</p:sld>
+</file>
+
+<file path=ppt/slides/slide16.xml><?xml version="1.0" encoding="utf-8"?>
+<p:sld xmlns:a="http://schemas.openxmlformats.org/drawingml/2006/main" xmlns:r="http://schemas.openxmlformats.org/officeDocument/2006/relationships" xmlns:p="http://schemas.openxmlformats.org/presentationml/2006/main">
+  <p:cSld>
+    <p:spTree>
+      <p:nvGrpSpPr>
+        <p:cNvPr id="1" name=""/>
+        <p:cNvGrpSpPr/>
+        <p:nvPr/>
+      </p:nvGrpSpPr>
+      <p:grpSpPr>
+        <a:xfrm>
+          <a:off x="0" y="0"/>
+          <a:ext cx="0" cy="0"/>
+          <a:chOff x="0" y="0"/>
+          <a:chExt cx="0" cy="0"/>
+        </a:xfrm>
+      </p:grpSpPr>
+      <p:pic>
+        <p:nvPicPr>
+          <p:cNvPr id="3" name="Content Placeholder 2"/>
+          <p:cNvPicPr>
+            <a:picLocks noGrp="1" noChangeAspect="1"/>
+          </p:cNvPicPr>
+          <p:nvPr>
+            <p:ph idx="1"/>
+          </p:nvPr>
+        </p:nvPicPr>
+        <p:blipFill>
+          <a:blip r:embed="rId2">
+            <a:extLst>
+              <a:ext uri="{28A0092B-C50C-407E-A947-70E740481C1C}">
+                <a14:useLocalDpi xmlns:a14="http://schemas.microsoft.com/office/drawing/2010/main" val="0"/>
+              </a:ext>
+            </a:extLst>
+          </a:blip>
+          <a:stretch>
+            <a:fillRect/>
+          </a:stretch>
+        </p:blipFill>
+        <p:spPr>
+          <a:xfrm>
+            <a:off x="198741" y="383177"/>
+            <a:ext cx="11366242" cy="6078585"/>
+          </a:xfrm>
+        </p:spPr>
+      </p:pic>
+    </p:spTree>
+    <p:extLst>
+      <p:ext uri="{BB962C8B-B14F-4D97-AF65-F5344CB8AC3E}">
+        <p14:creationId xmlns:p14="http://schemas.microsoft.com/office/powerpoint/2010/main" val="484080383"/>
+      </p:ext>
+    </p:extLst>
+  </p:cSld>
+  <p:clrMapOvr>
+    <a:masterClrMapping/>
+  </p:clrMapOvr>
+  <p:timing>
+    <p:tnLst>
+      <p:par>
+        <p:cTn id="1" dur="indefinite" restart="never" nodeType="tmRoot"/>
+      </p:par>
+    </p:tnLst>
+  </p:timing>
+</p:sld>
+</file>
+
+<file path=ppt/slides/slide17.xml><?xml version="1.0" encoding="utf-8"?>
+<p:sld xmlns:a="http://schemas.openxmlformats.org/drawingml/2006/main" xmlns:r="http://schemas.openxmlformats.org/officeDocument/2006/relationships" xmlns:p="http://schemas.openxmlformats.org/presentationml/2006/main">
+  <p:cSld>
+    <p:spTree>
+      <p:nvGrpSpPr>
+        <p:cNvPr id="1" name=""/>
+        <p:cNvGrpSpPr/>
+        <p:nvPr/>
+      </p:nvGrpSpPr>
+      <p:grpSpPr>
+        <a:xfrm>
+          <a:off x="0" y="0"/>
+          <a:ext cx="0" cy="0"/>
+          <a:chOff x="0" y="0"/>
+          <a:chExt cx="0" cy="0"/>
+        </a:xfrm>
+      </p:grpSpPr>
+      <p:pic>
+        <p:nvPicPr>
+          <p:cNvPr id="2" name="Picture 1"/>
+          <p:cNvPicPr>
+            <a:picLocks noChangeAspect="1"/>
+          </p:cNvPicPr>
+          <p:nvPr/>
+        </p:nvPicPr>
+        <p:blipFill>
+          <a:blip r:embed="rId2">
+            <a:extLst>
+              <a:ext uri="{28A0092B-C50C-407E-A947-70E740481C1C}">
+                <a14:useLocalDpi xmlns:a14="http://schemas.microsoft.com/office/drawing/2010/main" val="0"/>
+              </a:ext>
+            </a:extLst>
+          </a:blip>
+          <a:stretch>
+            <a:fillRect/>
+          </a:stretch>
+        </p:blipFill>
+        <p:spPr>
+          <a:xfrm>
+            <a:off x="0" y="512518"/>
+            <a:ext cx="12192000" cy="5832963"/>
+          </a:xfrm>
+          <a:prstGeom prst="rect">
+            <a:avLst/>
+          </a:prstGeom>
+        </p:spPr>
+      </p:pic>
+    </p:spTree>
+    <p:extLst>
+      <p:ext uri="{BB962C8B-B14F-4D97-AF65-F5344CB8AC3E}">
+        <p14:creationId xmlns:p14="http://schemas.microsoft.com/office/powerpoint/2010/main" val="13892366"/>
+      </p:ext>
+    </p:extLst>
+  </p:cSld>
+  <p:clrMapOvr>
+    <a:masterClrMapping/>
+  </p:clrMapOvr>
+</p:sld>
+</file>
+
+<file path=ppt/slides/slide18.xml><?xml version="1.0" encoding="utf-8"?>
+<p:sld xmlns:a="http://schemas.openxmlformats.org/drawingml/2006/main" xmlns:r="http://schemas.openxmlformats.org/officeDocument/2006/relationships" xmlns:p="http://schemas.openxmlformats.org/presentationml/2006/main">
+  <p:cSld>
+    <p:spTree>
+      <p:nvGrpSpPr>
+        <p:cNvPr id="1" name=""/>
+        <p:cNvGrpSpPr/>
+        <p:nvPr/>
+      </p:nvGrpSpPr>
+      <p:grpSpPr>
+        <a:xfrm>
+          <a:off x="0" y="0"/>
+          <a:ext cx="0" cy="0"/>
+          <a:chOff x="0" y="0"/>
+          <a:chExt cx="0" cy="0"/>
+        </a:xfrm>
+      </p:grpSpPr>
+      <p:pic>
+        <p:nvPicPr>
+          <p:cNvPr id="4" name="Content Placeholder 3"/>
+          <p:cNvPicPr>
+            <a:picLocks noGrp="1" noChangeAspect="1"/>
+          </p:cNvPicPr>
+          <p:nvPr>
+            <p:ph idx="1"/>
+          </p:nvPr>
+        </p:nvPicPr>
+        <p:blipFill>
+          <a:blip r:embed="rId2">
+            <a:extLst>
+              <a:ext uri="{28A0092B-C50C-407E-A947-70E740481C1C}">
+                <a14:useLocalDpi xmlns:a14="http://schemas.microsoft.com/office/drawing/2010/main" val="0"/>
+              </a:ext>
+            </a:extLst>
+          </a:blip>
+          <a:stretch>
+            <a:fillRect/>
+          </a:stretch>
+        </p:blipFill>
+        <p:spPr>
+          <a:xfrm>
+            <a:off x="581518" y="48302"/>
+            <a:ext cx="11102482" cy="6531431"/>
+          </a:xfrm>
+        </p:spPr>
+      </p:pic>
+    </p:spTree>
+    <p:extLst>
+      <p:ext uri="{BB962C8B-B14F-4D97-AF65-F5344CB8AC3E}">
+        <p14:creationId xmlns:p14="http://schemas.microsoft.com/office/powerpoint/2010/main" val="1615379028"/>
+      </p:ext>
+    </p:extLst>
+  </p:cSld>
+  <p:clrMapOvr>
+    <a:masterClrMapping/>
+  </p:clrMapOvr>
+</p:sld>
+</file>
+
+<file path=ppt/slides/slide19.xml><?xml version="1.0" encoding="utf-8"?>
+<p:sld xmlns:a="http://schemas.openxmlformats.org/drawingml/2006/main" xmlns:r="http://schemas.openxmlformats.org/officeDocument/2006/relationships" xmlns:p="http://schemas.openxmlformats.org/presentationml/2006/main">
+  <p:cSld>
+    <p:spTree>
+      <p:nvGrpSpPr>
+        <p:cNvPr id="1" name=""/>
+        <p:cNvGrpSpPr/>
+        <p:nvPr/>
+      </p:nvGrpSpPr>
+      <p:grpSpPr>
+        <a:xfrm>
+          <a:off x="0" y="0"/>
+          <a:ext cx="0" cy="0"/>
+          <a:chOff x="0" y="0"/>
+          <a:chExt cx="0" cy="0"/>
+        </a:xfrm>
+      </p:grpSpPr>
+      <p:pic>
+        <p:nvPicPr>
+          <p:cNvPr id="4" name="Picture 3"/>
+          <p:cNvPicPr>
+            <a:picLocks noChangeAspect="1"/>
+          </p:cNvPicPr>
+          <p:nvPr/>
+        </p:nvPicPr>
+        <p:blipFill>
+          <a:blip r:embed="rId2">
+            <a:extLst>
+              <a:ext uri="{28A0092B-C50C-407E-A947-70E740481C1C}">
+                <a14:useLocalDpi xmlns:a14="http://schemas.microsoft.com/office/drawing/2010/main" val="0"/>
+              </a:ext>
+            </a:extLst>
+          </a:blip>
+          <a:stretch>
+            <a:fillRect/>
+          </a:stretch>
+        </p:blipFill>
+        <p:spPr>
+          <a:xfrm>
+            <a:off x="119062" y="100012"/>
+            <a:ext cx="12067112" cy="6757988"/>
+          </a:xfrm>
+          <a:prstGeom prst="rect">
+            <a:avLst/>
+          </a:prstGeom>
+        </p:spPr>
+      </p:pic>
+    </p:spTree>
+    <p:extLst>
+      <p:ext uri="{BB962C8B-B14F-4D97-AF65-F5344CB8AC3E}">
+        <p14:creationId xmlns:p14="http://schemas.microsoft.com/office/powerpoint/2010/main" val="2137163140"/>
+      </p:ext>
+    </p:extLst>
+  </p:cSld>
+  <p:clrMapOvr>
+    <a:masterClrMapping/>
+  </p:clrMapOvr>
+  <p:timing>
+    <p:tnLst>
+      <p:par>
+        <p:cTn id="1" dur="indefinite" restart="never" nodeType="tmRoot"/>
+      </p:par>
+    </p:tnLst>
+  </p:timing>
+</p:sld>
+</file>
+
+<file path=ppt/slides/slide2.xml><?xml version="1.0" encoding="utf-8"?>
+<p:sld xmlns:a="http://schemas.openxmlformats.org/drawingml/2006/main" xmlns:r="http://schemas.openxmlformats.org/officeDocument/2006/relationships" xmlns:p="http://schemas.openxmlformats.org/presentationml/2006/main">
+  <p:cSld>
+    <p:spTree>
+      <p:nvGrpSpPr>
+        <p:cNvPr id="1" name=""/>
+        <p:cNvGrpSpPr/>
+        <p:nvPr/>
+      </p:nvGrpSpPr>
+      <p:grpSpPr>
+        <a:xfrm>
+          <a:off x="0" y="0"/>
+          <a:ext cx="0" cy="0"/>
+          <a:chOff x="0" y="0"/>
+          <a:chExt cx="0" cy="0"/>
+        </a:xfrm>
+      </p:grpSpPr>
+      <p:pic>
+        <p:nvPicPr>
+          <p:cNvPr id="4" name="Picture 3"/>
+          <p:cNvPicPr>
+            <a:picLocks noChangeAspect="1"/>
+          </p:cNvPicPr>
+          <p:nvPr/>
+        </p:nvPicPr>
+        <p:blipFill>
+          <a:blip r:embed="rId2">
+            <a:extLst>
+              <a:ext uri="{28A0092B-C50C-407E-A947-70E740481C1C}">
+                <a14:useLocalDpi xmlns:a14="http://schemas.microsoft.com/office/drawing/2010/main" val="0"/>
+              </a:ext>
+            </a:extLst>
+          </a:blip>
+          <a:stretch>
+            <a:fillRect/>
+          </a:stretch>
+        </p:blipFill>
+        <p:spPr>
+          <a:xfrm>
+            <a:off x="215265" y="135429"/>
+            <a:ext cx="11764200" cy="6298622"/>
+          </a:xfrm>
+          <a:prstGeom prst="rect">
+            <a:avLst/>
+          </a:prstGeom>
+        </p:spPr>
+      </p:pic>
+    </p:spTree>
+    <p:extLst>
+      <p:ext uri="{BB962C8B-B14F-4D97-AF65-F5344CB8AC3E}">
+        <p14:creationId xmlns:p14="http://schemas.microsoft.com/office/powerpoint/2010/main" val="1108920473"/>
+      </p:ext>
+    </p:extLst>
+  </p:cSld>
+  <p:clrMapOvr>
+    <a:masterClrMapping/>
+  </p:clrMapOvr>
+  <p:timing>
+    <p:tnLst>
+      <p:par>
+        <p:cTn id="1" dur="indefinite" restart="never" nodeType="tmRoot"/>
+      </p:par>
+    </p:tnLst>
+  </p:timing>
+</p:sld>
+</file>
+
+<file path=ppt/slides/slide20.xml><?xml version="1.0" encoding="utf-8"?>
+<p:sld xmlns:a="http://schemas.openxmlformats.org/drawingml/2006/main" xmlns:r="http://schemas.openxmlformats.org/officeDocument/2006/relationships" xmlns:p="http://schemas.openxmlformats.org/presentationml/2006/main">
+  <p:cSld>
+    <p:spTree>
+      <p:nvGrpSpPr>
+        <p:cNvPr id="1" name=""/>
+        <p:cNvGrpSpPr/>
+        <p:nvPr/>
+      </p:nvGrpSpPr>
+      <p:grpSpPr>
+        <a:xfrm>
+          <a:off x="0" y="0"/>
+          <a:ext cx="0" cy="0"/>
+          <a:chOff x="0" y="0"/>
+          <a:chExt cx="0" cy="0"/>
+        </a:xfrm>
+      </p:grpSpPr>
+      <p:sp>
+        <p:nvSpPr>
+          <p:cNvPr id="2" name="Title 1"/>
+          <p:cNvSpPr>
+            <a:spLocks noGrp="1"/>
+          </p:cNvSpPr>
+          <p:nvPr>
+            <p:ph type="title"/>
+          </p:nvPr>
+        </p:nvSpPr>
+        <p:spPr/>
+        <p:txBody>
+          <a:bodyPr/>
+          <a:lstStyle/>
+          <a:p>
+            <a:endParaRPr lang="en-US" dirty="0"/>
+          </a:p>
+        </p:txBody>
+      </p:sp>
+      <p:pic>
+        <p:nvPicPr>
+          <p:cNvPr id="4" name="Picture 3"/>
+          <p:cNvPicPr>
+            <a:picLocks noChangeAspect="1"/>
+          </p:cNvPicPr>
+          <p:nvPr/>
+        </p:nvPicPr>
+        <p:blipFill>
+          <a:blip r:embed="rId2">
+            <a:extLst>
+              <a:ext uri="{28A0092B-C50C-407E-A947-70E740481C1C}">
+                <a14:useLocalDpi xmlns:a14="http://schemas.microsoft.com/office/drawing/2010/main" val="0"/>
+              </a:ext>
+            </a:extLst>
+          </a:blip>
+          <a:stretch>
+            <a:fillRect/>
+          </a:stretch>
+        </p:blipFill>
+        <p:spPr>
+          <a:xfrm>
+            <a:off x="171951" y="0"/>
+            <a:ext cx="11848097" cy="6858000"/>
+          </a:xfrm>
+          <a:prstGeom prst="rect">
+            <a:avLst/>
+          </a:prstGeom>
+        </p:spPr>
+      </p:pic>
+    </p:spTree>
+    <p:extLst>
+      <p:ext uri="{BB962C8B-B14F-4D97-AF65-F5344CB8AC3E}">
+        <p14:creationId xmlns:p14="http://schemas.microsoft.com/office/powerpoint/2010/main" val="1235198211"/>
+      </p:ext>
+    </p:extLst>
+  </p:cSld>
+  <p:clrMapOvr>
+    <a:masterClrMapping/>
+  </p:clrMapOvr>
+  <p:timing>
+    <p:tnLst>
+      <p:par>
+        <p:cTn id="1" dur="indefinite" restart="never" nodeType="tmRoot"/>
+      </p:par>
+    </p:tnLst>
+  </p:timing>
+</p:sld>
+</file>
+
+<file path=ppt/slides/slide21.xml><?xml version="1.0" encoding="utf-8"?>
+<p:sld xmlns:a="http://schemas.openxmlformats.org/drawingml/2006/main" xmlns:r="http://schemas.openxmlformats.org/officeDocument/2006/relationships" xmlns:p="http://schemas.openxmlformats.org/presentationml/2006/main">
+  <p:cSld>
+    <p:spTree>
+      <p:nvGrpSpPr>
+        <p:cNvPr id="1" name=""/>
+        <p:cNvGrpSpPr/>
+        <p:nvPr/>
+      </p:nvGrpSpPr>
+      <p:grpSpPr>
+        <a:xfrm>
+          <a:off x="0" y="0"/>
+          <a:ext cx="0" cy="0"/>
+          <a:chOff x="0" y="0"/>
+          <a:chExt cx="0" cy="0"/>
+        </a:xfrm>
+      </p:grpSpPr>
+      <p:pic>
+        <p:nvPicPr>
+          <p:cNvPr id="4" name="Picture 3"/>
+          <p:cNvPicPr>
+            <a:picLocks noChangeAspect="1"/>
+          </p:cNvPicPr>
+          <p:nvPr/>
+        </p:nvPicPr>
+        <p:blipFill>
+          <a:blip r:embed="rId3">
+            <a:extLst>
+              <a:ext uri="{28A0092B-C50C-407E-A947-70E740481C1C}">
+                <a14:useLocalDpi xmlns:a14="http://schemas.microsoft.com/office/drawing/2010/main" val="0"/>
+              </a:ext>
+            </a:extLst>
+          </a:blip>
+          <a:stretch>
+            <a:fillRect/>
+          </a:stretch>
+        </p:blipFill>
+        <p:spPr>
+          <a:xfrm>
+            <a:off x="516222" y="0"/>
+            <a:ext cx="11459878" cy="6858000"/>
+          </a:xfrm>
+          <a:prstGeom prst="rect">
+            <a:avLst/>
+          </a:prstGeom>
+        </p:spPr>
+      </p:pic>
+    </p:spTree>
+    <p:extLst>
+      <p:ext uri="{BB962C8B-B14F-4D97-AF65-F5344CB8AC3E}">
+        <p14:creationId xmlns:p14="http://schemas.microsoft.com/office/powerpoint/2010/main" val="2476894719"/>
+      </p:ext>
+    </p:extLst>
+  </p:cSld>
+  <p:clrMapOvr>
+    <a:masterClrMapping/>
+  </p:clrMapOvr>
+  <p:timing>
+    <p:tnLst>
+      <p:par>
+        <p:cTn id="1" dur="indefinite" restart="never" nodeType="tmRoot"/>
+      </p:par>
+    </p:tnLst>
+  </p:timing>
+</p:sld>
+</file>
+
+<file path=ppt/slides/slide22.xml><?xml version="1.0" encoding="utf-8"?>
+<p:sld xmlns:a="http://schemas.openxmlformats.org/drawingml/2006/main" xmlns:r="http://schemas.openxmlformats.org/officeDocument/2006/relationships" xmlns:p="http://schemas.openxmlformats.org/presentationml/2006/main">
+  <p:cSld>
+    <p:spTree>
+      <p:nvGrpSpPr>
+        <p:cNvPr id="1" name=""/>
+        <p:cNvGrpSpPr/>
+        <p:nvPr/>
+      </p:nvGrpSpPr>
+      <p:grpSpPr>
+        <a:xfrm>
+          <a:off x="0" y="0"/>
+          <a:ext cx="0" cy="0"/>
+          <a:chOff x="0" y="0"/>
+          <a:chExt cx="0" cy="0"/>
+        </a:xfrm>
+      </p:grpSpPr>
+      <p:pic>
+        <p:nvPicPr>
+          <p:cNvPr id="5" name="Picture 4"/>
+          <p:cNvPicPr>
+            <a:picLocks noChangeAspect="1"/>
+          </p:cNvPicPr>
+          <p:nvPr/>
+        </p:nvPicPr>
+        <p:blipFill>
+          <a:blip r:embed="rId2">
+            <a:extLst>
+              <a:ext uri="{28A0092B-C50C-407E-A947-70E740481C1C}">
+                <a14:useLocalDpi xmlns:a14="http://schemas.microsoft.com/office/drawing/2010/main" val="0"/>
+              </a:ext>
+            </a:extLst>
+          </a:blip>
+          <a:stretch>
+            <a:fillRect/>
+          </a:stretch>
+        </p:blipFill>
+        <p:spPr>
+          <a:xfrm>
+            <a:off x="538975" y="0"/>
+            <a:ext cx="11114049" cy="6858000"/>
+          </a:xfrm>
+          <a:prstGeom prst="rect">
+            <a:avLst/>
+          </a:prstGeom>
+        </p:spPr>
+      </p:pic>
+    </p:spTree>
+    <p:extLst>
+      <p:ext uri="{BB962C8B-B14F-4D97-AF65-F5344CB8AC3E}">
+        <p14:creationId xmlns:p14="http://schemas.microsoft.com/office/powerpoint/2010/main" val="1048828085"/>
+      </p:ext>
+    </p:extLst>
+  </p:cSld>
+  <p:clrMapOvr>
+    <a:masterClrMapping/>
+  </p:clrMapOvr>
+  <p:timing>
+    <p:tnLst>
+      <p:par>
+        <p:cTn id="1" dur="indefinite" restart="never" nodeType="tmRoot"/>
+      </p:par>
+    </p:tnLst>
+  </p:timing>
+</p:sld>
+</file>
+
+<file path=ppt/slides/slide23.xml><?xml version="1.0" encoding="utf-8"?>
+<p:sld xmlns:a="http://schemas.openxmlformats.org/drawingml/2006/main" xmlns:r="http://schemas.openxmlformats.org/officeDocument/2006/relationships" xmlns:p="http://schemas.openxmlformats.org/presentationml/2006/main">
+  <p:cSld>
+    <p:spTree>
+      <p:nvGrpSpPr>
+        <p:cNvPr id="1" name=""/>
+        <p:cNvGrpSpPr/>
+        <p:nvPr/>
+      </p:nvGrpSpPr>
+      <p:grpSpPr>
+        <a:xfrm>
+          <a:off x="0" y="0"/>
+          <a:ext cx="0" cy="0"/>
+          <a:chOff x="0" y="0"/>
+          <a:chExt cx="0" cy="0"/>
+        </a:xfrm>
+      </p:grpSpPr>
+      <p:pic>
+        <p:nvPicPr>
+          <p:cNvPr id="3" name="Content Placeholder 2"/>
+          <p:cNvPicPr>
+            <a:picLocks noGrp="1" noChangeAspect="1"/>
+          </p:cNvPicPr>
+          <p:nvPr>
+            <p:ph idx="1"/>
+          </p:nvPr>
+        </p:nvPicPr>
+        <p:blipFill>
+          <a:blip r:embed="rId2">
+            <a:extLst>
+              <a:ext uri="{28A0092B-C50C-407E-A947-70E740481C1C}">
+                <a14:useLocalDpi xmlns:a14="http://schemas.microsoft.com/office/drawing/2010/main" val="0"/>
+              </a:ext>
+            </a:extLst>
+          </a:blip>
+          <a:stretch>
+            <a:fillRect/>
+          </a:stretch>
+        </p:blipFill>
+        <p:spPr>
+          <a:xfrm>
+            <a:off x="-15240" y="661851"/>
+            <a:ext cx="12207240" cy="5529943"/>
+          </a:xfrm>
+        </p:spPr>
+      </p:pic>
+    </p:spTree>
+    <p:extLst>
+      <p:ext uri="{BB962C8B-B14F-4D97-AF65-F5344CB8AC3E}">
+        <p14:creationId xmlns:p14="http://schemas.microsoft.com/office/powerpoint/2010/main" val="2273175920"/>
+      </p:ext>
+    </p:extLst>
+  </p:cSld>
+  <p:clrMapOvr>
+    <a:masterClrMapping/>
+  </p:clrMapOvr>
+  <p:timing>
+    <p:tnLst>
+      <p:par>
+        <p:cTn id="1" dur="indefinite" restart="never" nodeType="tmRoot"/>
+      </p:par>
+    </p:tnLst>
+  </p:timing>
+</p:sld>
+</file>
+
+<file path=ppt/slides/slide24.xml><?xml version="1.0" encoding="utf-8"?>
+<p:sld xmlns:a="http://schemas.openxmlformats.org/drawingml/2006/main" xmlns:r="http://schemas.openxmlformats.org/officeDocument/2006/relationships" xmlns:p="http://schemas.openxmlformats.org/presentationml/2006/main">
+  <p:cSld>
+    <p:spTree>
+      <p:nvGrpSpPr>
+        <p:cNvPr id="1" name=""/>
+        <p:cNvGrpSpPr/>
+        <p:nvPr/>
+      </p:nvGrpSpPr>
+      <p:grpSpPr>
+        <a:xfrm>
+          <a:off x="0" y="0"/>
+          <a:ext cx="0" cy="0"/>
+          <a:chOff x="0" y="0"/>
+          <a:chExt cx="0" cy="0"/>
+        </a:xfrm>
+      </p:grpSpPr>
+      <p:pic>
+        <p:nvPicPr>
+          <p:cNvPr id="3" name="Picture 2"/>
+          <p:cNvPicPr>
+            <a:picLocks noChangeAspect="1"/>
+          </p:cNvPicPr>
+          <p:nvPr/>
+        </p:nvPicPr>
+        <p:blipFill>
+          <a:blip r:embed="rId2">
+            <a:extLst>
+              <a:ext uri="{28A0092B-C50C-407E-A947-70E740481C1C}">
+                <a14:useLocalDpi xmlns:a14="http://schemas.microsoft.com/office/drawing/2010/main" val="0"/>
+              </a:ext>
+            </a:extLst>
+          </a:blip>
+          <a:stretch>
+            <a:fillRect/>
+          </a:stretch>
+        </p:blipFill>
+        <p:spPr>
+          <a:xfrm>
+            <a:off x="679949" y="380047"/>
+            <a:ext cx="10902451" cy="6216402"/>
+          </a:xfrm>
+          <a:prstGeom prst="rect">
+            <a:avLst/>
+          </a:prstGeom>
+        </p:spPr>
+      </p:pic>
+    </p:spTree>
+    <p:extLst>
+      <p:ext uri="{BB962C8B-B14F-4D97-AF65-F5344CB8AC3E}">
+        <p14:creationId xmlns:p14="http://schemas.microsoft.com/office/powerpoint/2010/main" val="1846852608"/>
+      </p:ext>
+    </p:extLst>
+  </p:cSld>
+  <p:clrMapOvr>
+    <a:masterClrMapping/>
+  </p:clrMapOvr>
+  <p:timing>
+    <p:tnLst>
+      <p:par>
+        <p:cTn id="1" dur="indefinite" restart="never" nodeType="tmRoot"/>
+      </p:par>
+    </p:tnLst>
+  </p:timing>
+</p:sld>
+</file>
+
+<file path=ppt/slides/slide3.xml><?xml version="1.0" encoding="utf-8"?>
+<p:sld xmlns:a="http://schemas.openxmlformats.org/drawingml/2006/main" xmlns:r="http://schemas.openxmlformats.org/officeDocument/2006/relationships" xmlns:p="http://schemas.openxmlformats.org/presentationml/2006/main">
+  <p:cSld>
+    <p:spTree>
+      <p:nvGrpSpPr>
+        <p:cNvPr id="1" name=""/>
+        <p:cNvGrpSpPr/>
+        <p:nvPr/>
+      </p:nvGrpSpPr>
+      <p:grpSpPr>
+        <a:xfrm>
+          <a:off x="0" y="0"/>
+          <a:ext cx="0" cy="0"/>
+          <a:chOff x="0" y="0"/>
+          <a:chExt cx="0" cy="0"/>
+        </a:xfrm>
+      </p:grpSpPr>
+      <p:pic>
+        <p:nvPicPr>
+          <p:cNvPr id="4" name="Picture 3"/>
+          <p:cNvPicPr>
+            <a:picLocks noChangeAspect="1"/>
+          </p:cNvPicPr>
+          <p:nvPr/>
+        </p:nvPicPr>
+        <p:blipFill>
+          <a:blip r:embed="rId2">
+            <a:extLst>
+              <a:ext uri="{28A0092B-C50C-407E-A947-70E740481C1C}">
+                <a14:useLocalDpi xmlns:a14="http://schemas.microsoft.com/office/drawing/2010/main" val="0"/>
+              </a:ext>
+            </a:extLst>
+          </a:blip>
+          <a:stretch>
+            <a:fillRect/>
+          </a:stretch>
+        </p:blipFill>
+        <p:spPr>
+          <a:xfrm>
+            <a:off x="150476" y="470708"/>
+            <a:ext cx="12041524" cy="6046470"/>
+          </a:xfrm>
+          <a:prstGeom prst="rect">
+            <a:avLst/>
+          </a:prstGeom>
+        </p:spPr>
+      </p:pic>
+    </p:spTree>
+    <p:extLst>
+      <p:ext uri="{BB962C8B-B14F-4D97-AF65-F5344CB8AC3E}">
+        <p14:creationId xmlns:p14="http://schemas.microsoft.com/office/powerpoint/2010/main" val="432654944"/>
+      </p:ext>
+    </p:extLst>
+  </p:cSld>
+  <p:clrMapOvr>
+    <a:masterClrMapping/>
+  </p:clrMapOvr>
+  <p:timing>
+    <p:tnLst>
+      <p:par>
+        <p:cTn id="1" dur="indefinite" restart="never" nodeType="tmRoot"/>
+      </p:par>
+    </p:tnLst>
+  </p:timing>
+</p:sld>
+</file>
+
+<file path=ppt/slides/slide4.xml><?xml version="1.0" encoding="utf-8"?>
+<p:sld xmlns:a="http://schemas.openxmlformats.org/drawingml/2006/main" xmlns:r="http://schemas.openxmlformats.org/officeDocument/2006/relationships" xmlns:p="http://schemas.openxmlformats.org/presentationml/2006/main">
+  <p:cSld>
+    <p:spTree>
+      <p:nvGrpSpPr>
+        <p:cNvPr id="1" name=""/>
+        <p:cNvGrpSpPr/>
+        <p:nvPr/>
+      </p:nvGrpSpPr>
+      <p:grpSpPr>
+        <a:xfrm>
+          <a:off x="0" y="0"/>
+          <a:ext cx="0" cy="0"/>
+          <a:chOff x="0" y="0"/>
+          <a:chExt cx="0" cy="0"/>
+        </a:xfrm>
+      </p:grpSpPr>
+      <p:pic>
+        <p:nvPicPr>
+          <p:cNvPr id="4" name="Picture 3"/>
+          <p:cNvPicPr>
+            <a:picLocks noChangeAspect="1"/>
+          </p:cNvPicPr>
+          <p:nvPr/>
+        </p:nvPicPr>
+        <p:blipFill>
+          <a:blip r:embed="rId2">
+            <a:extLst>
+              <a:ext uri="{28A0092B-C50C-407E-A947-70E740481C1C}">
+                <a14:useLocalDpi xmlns:a14="http://schemas.microsoft.com/office/drawing/2010/main" val="0"/>
+              </a:ext>
+            </a:extLst>
+          </a:blip>
+          <a:stretch>
+            <a:fillRect/>
+          </a:stretch>
+        </p:blipFill>
+        <p:spPr>
+          <a:xfrm>
+            <a:off x="847725" y="471487"/>
+            <a:ext cx="10496550" cy="5915025"/>
+          </a:xfrm>
+          <a:prstGeom prst="rect">
+            <a:avLst/>
+          </a:prstGeom>
+        </p:spPr>
+      </p:pic>
+    </p:spTree>
+    <p:extLst>
+      <p:ext uri="{BB962C8B-B14F-4D97-AF65-F5344CB8AC3E}">
+        <p14:creationId xmlns:p14="http://schemas.microsoft.com/office/powerpoint/2010/main" val="2651226153"/>
+      </p:ext>
+    </p:extLst>
+  </p:cSld>
+  <p:clrMapOvr>
+    <a:masterClrMapping/>
+  </p:clrMapOvr>
+  <p:timing>
+    <p:tnLst>
+      <p:par>
+        <p:cTn id="1" dur="indefinite" restart="never" nodeType="tmRoot"/>
+      </p:par>
+    </p:tnLst>
+  </p:timing>
+</p:sld>
+</file>
+
+<file path=ppt/slides/slide5.xml><?xml version="1.0" encoding="utf-8"?>
+<p:sld xmlns:a="http://schemas.openxmlformats.org/drawingml/2006/main" xmlns:r="http://schemas.openxmlformats.org/officeDocument/2006/relationships" xmlns:p="http://schemas.openxmlformats.org/presentationml/2006/main">
+  <p:cSld>
+    <p:spTree>
+      <p:nvGrpSpPr>
+        <p:cNvPr id="1" name=""/>
+        <p:cNvGrpSpPr/>
+        <p:nvPr/>
+      </p:nvGrpSpPr>
+      <p:grpSpPr>
+        <a:xfrm>
+          <a:off x="0" y="0"/>
+          <a:ext cx="0" cy="0"/>
+          <a:chOff x="0" y="0"/>
+          <a:chExt cx="0" cy="0"/>
+        </a:xfrm>
+      </p:grpSpPr>
+      <p:pic>
+        <p:nvPicPr>
+          <p:cNvPr id="4" name="Picture 3"/>
+          <p:cNvPicPr>
+            <a:picLocks noChangeAspect="1"/>
+          </p:cNvPicPr>
+          <p:nvPr/>
+        </p:nvPicPr>
+        <p:blipFill>
+          <a:blip r:embed="rId2">
+            <a:extLst>
+              <a:ext uri="{28A0092B-C50C-407E-A947-70E740481C1C}">
+                <a14:useLocalDpi xmlns:a14="http://schemas.microsoft.com/office/drawing/2010/main" val="0"/>
+              </a:ext>
+            </a:extLst>
+          </a:blip>
+          <a:stretch>
+            <a:fillRect/>
+          </a:stretch>
+        </p:blipFill>
+        <p:spPr>
+          <a:xfrm>
+            <a:off x="363942" y="480319"/>
+            <a:ext cx="11581269" cy="5887230"/>
+          </a:xfrm>
+          <a:prstGeom prst="rect">
+            <a:avLst/>
+          </a:prstGeom>
+        </p:spPr>
+      </p:pic>
+    </p:spTree>
+    <p:extLst>
+      <p:ext uri="{BB962C8B-B14F-4D97-AF65-F5344CB8AC3E}">
+        <p14:creationId xmlns:p14="http://schemas.microsoft.com/office/powerpoint/2010/main" val="2292033970"/>
+      </p:ext>
+    </p:extLst>
+  </p:cSld>
+  <p:clrMapOvr>
+    <a:masterClrMapping/>
+  </p:clrMapOvr>
+  <p:timing>
+    <p:tnLst>
+      <p:par>
+        <p:cTn id="1" dur="indefinite" restart="never" nodeType="tmRoot"/>
+      </p:par>
+    </p:tnLst>
+  </p:timing>
+</p:sld>
+</file>
+
+<file path=ppt/slides/slide6.xml><?xml version="1.0" encoding="utf-8"?>
+<p:sld xmlns:a="http://schemas.openxmlformats.org/drawingml/2006/main" xmlns:r="http://schemas.openxmlformats.org/officeDocument/2006/relationships" xmlns:p="http://schemas.openxmlformats.org/presentationml/2006/main">
+  <p:cSld>
+    <p:spTree>
+      <p:nvGrpSpPr>
+        <p:cNvPr id="1" name=""/>
+        <p:cNvGrpSpPr/>
+        <p:nvPr/>
+      </p:nvGrpSpPr>
+      <p:grpSpPr>
+        <a:xfrm>
+          <a:off x="0" y="0"/>
+          <a:ext cx="0" cy="0"/>
+          <a:chOff x="0" y="0"/>
+          <a:chExt cx="0" cy="0"/>
+        </a:xfrm>
+      </p:grpSpPr>
+      <p:pic>
+        <p:nvPicPr>
+          <p:cNvPr id="4" name="Picture 3"/>
+          <p:cNvPicPr>
+            <a:picLocks noChangeAspect="1"/>
+          </p:cNvPicPr>
+          <p:nvPr/>
+        </p:nvPicPr>
+        <p:blipFill>
+          <a:blip r:embed="rId2">
+            <a:extLst>
+              <a:ext uri="{28A0092B-C50C-407E-A947-70E740481C1C}">
+                <a14:useLocalDpi xmlns:a14="http://schemas.microsoft.com/office/drawing/2010/main" val="0"/>
+              </a:ext>
+            </a:extLst>
+          </a:blip>
+          <a:stretch>
+            <a:fillRect/>
+          </a:stretch>
+        </p:blipFill>
+        <p:spPr>
+          <a:xfrm>
+            <a:off x="0" y="331787"/>
+            <a:ext cx="12079129" cy="6526213"/>
+          </a:xfrm>
+          <a:prstGeom prst="rect">
+            <a:avLst/>
+          </a:prstGeom>
+        </p:spPr>
+      </p:pic>
+    </p:spTree>
+    <p:extLst>
+      <p:ext uri="{BB962C8B-B14F-4D97-AF65-F5344CB8AC3E}">
+        <p14:creationId xmlns:p14="http://schemas.microsoft.com/office/powerpoint/2010/main" val="28290632"/>
+      </p:ext>
+    </p:extLst>
+  </p:cSld>
+  <p:clrMapOvr>
+    <a:masterClrMapping/>
+  </p:clrMapOvr>
+  <p:timing>
+    <p:tnLst>
+      <p:par>
+        <p:cTn id="1" dur="indefinite" restart="never" nodeType="tmRoot"/>
+      </p:par>
+    </p:tnLst>
+  </p:timing>
+</p:sld>
+</file>
+
+<file path=ppt/slides/slide7.xml><?xml version="1.0" encoding="utf-8"?>
+<p:sld xmlns:a="http://schemas.openxmlformats.org/drawingml/2006/main" xmlns:r="http://schemas.openxmlformats.org/officeDocument/2006/relationships" xmlns:p="http://schemas.openxmlformats.org/presentationml/2006/main">
+  <p:cSld>
+    <p:spTree>
+      <p:nvGrpSpPr>
+        <p:cNvPr id="1" name=""/>
+        <p:cNvGrpSpPr/>
+        <p:nvPr/>
+      </p:nvGrpSpPr>
+      <p:grpSpPr>
+        <a:xfrm>
+          <a:off x="0" y="0"/>
+          <a:ext cx="0" cy="0"/>
+          <a:chOff x="0" y="0"/>
+          <a:chExt cx="0" cy="0"/>
+        </a:xfrm>
+      </p:grpSpPr>
+      <p:pic>
+        <p:nvPicPr>
+          <p:cNvPr id="4" name="Picture 3"/>
+          <p:cNvPicPr>
+            <a:picLocks noChangeAspect="1"/>
+          </p:cNvPicPr>
+          <p:nvPr/>
+        </p:nvPicPr>
+        <p:blipFill>
+          <a:blip r:embed="rId2">
+            <a:extLst>
+              <a:ext uri="{28A0092B-C50C-407E-A947-70E740481C1C}">
+                <a14:useLocalDpi xmlns:a14="http://schemas.microsoft.com/office/drawing/2010/main" val="0"/>
+              </a:ext>
+            </a:extLst>
+          </a:blip>
+          <a:stretch>
+            <a:fillRect/>
+          </a:stretch>
+        </p:blipFill>
+        <p:spPr>
+          <a:xfrm>
+            <a:off x="-1" y="238124"/>
+            <a:ext cx="11928475" cy="6315075"/>
+          </a:xfrm>
+          <a:prstGeom prst="rect">
+            <a:avLst/>
+          </a:prstGeom>
+        </p:spPr>
+      </p:pic>
+    </p:spTree>
+    <p:extLst>
+      <p:ext uri="{BB962C8B-B14F-4D97-AF65-F5344CB8AC3E}">
+        <p14:creationId xmlns:p14="http://schemas.microsoft.com/office/powerpoint/2010/main" val="1886599859"/>
+      </p:ext>
+    </p:extLst>
+  </p:cSld>
+  <p:clrMapOvr>
+    <a:masterClrMapping/>
+  </p:clrMapOvr>
+</p:sld>
+</file>
+
+<file path=ppt/slides/slide8.xml><?xml version="1.0" encoding="utf-8"?>
+<p:sld xmlns:a="http://schemas.openxmlformats.org/drawingml/2006/main" xmlns:r="http://schemas.openxmlformats.org/officeDocument/2006/relationships" xmlns:p="http://schemas.openxmlformats.org/presentationml/2006/main">
+  <p:cSld>
+    <p:spTree>
+      <p:nvGrpSpPr>
+        <p:cNvPr id="1" name=""/>
+        <p:cNvGrpSpPr/>
+        <p:nvPr/>
+      </p:nvGrpSpPr>
+      <p:grpSpPr>
+        <a:xfrm>
+          <a:off x="0" y="0"/>
+          <a:ext cx="0" cy="0"/>
+          <a:chOff x="0" y="0"/>
+          <a:chExt cx="0" cy="0"/>
+        </a:xfrm>
+      </p:grpSpPr>
+      <p:pic>
+        <p:nvPicPr>
+          <p:cNvPr id="4" name="Picture 3"/>
+          <p:cNvPicPr>
+            <a:picLocks noChangeAspect="1"/>
+          </p:cNvPicPr>
+          <p:nvPr/>
+        </p:nvPicPr>
+        <p:blipFill>
+          <a:blip r:embed="rId2">
+            <a:extLst>
+              <a:ext uri="{28A0092B-C50C-407E-A947-70E740481C1C}">
+                <a14:useLocalDpi xmlns:a14="http://schemas.microsoft.com/office/drawing/2010/main" val="0"/>
+              </a:ext>
+            </a:extLst>
+          </a:blip>
+          <a:stretch>
+            <a:fillRect/>
+          </a:stretch>
+        </p:blipFill>
+        <p:spPr>
+          <a:xfrm>
+            <a:off x="0" y="384175"/>
+            <a:ext cx="12365618" cy="6473825"/>
+          </a:xfrm>
+          <a:prstGeom prst="rect">
+            <a:avLst/>
+          </a:prstGeom>
+        </p:spPr>
+      </p:pic>
+    </p:spTree>
+    <p:extLst>
+      <p:ext uri="{BB962C8B-B14F-4D97-AF65-F5344CB8AC3E}">
+        <p14:creationId xmlns:p14="http://schemas.microsoft.com/office/powerpoint/2010/main" val="3646351307"/>
+      </p:ext>
+    </p:extLst>
+  </p:cSld>
+  <p:clrMapOvr>
+    <a:masterClrMapping/>
+  </p:clrMapOvr>
+</p:sld>
+</file>
+
+<file path=ppt/slides/slide9.xml><?xml version="1.0" encoding="utf-8"?>
+<p:sld xmlns:a="http://schemas.openxmlformats.org/drawingml/2006/main" xmlns:r="http://schemas.openxmlformats.org/officeDocument/2006/relationships" xmlns:p="http://schemas.openxmlformats.org/presentationml/2006/main">
+  <p:cSld>
+    <p:spTree>
+      <p:nvGrpSpPr>
+        <p:cNvPr id="1" name=""/>
+        <p:cNvGrpSpPr/>
+        <p:nvPr/>
+      </p:nvGrpSpPr>
+      <p:grpSpPr>
+        <a:xfrm>
+          <a:off x="0" y="0"/>
+          <a:ext cx="0" cy="0"/>
+          <a:chOff x="0" y="0"/>
+          <a:chExt cx="0" cy="0"/>
+        </a:xfrm>
+      </p:grpSpPr>
+      <p:pic>
+        <p:nvPicPr>
+          <p:cNvPr id="5" name="Picture 4"/>
+          <p:cNvPicPr>
+            <a:picLocks noChangeAspect="1"/>
+          </p:cNvPicPr>
+          <p:nvPr/>
+        </p:nvPicPr>
+        <p:blipFill>
+          <a:blip r:embed="rId2">
+            <a:extLst>
+              <a:ext uri="{28A0092B-C50C-407E-A947-70E740481C1C}">
+                <a14:useLocalDpi xmlns:a14="http://schemas.microsoft.com/office/drawing/2010/main" val="0"/>
+              </a:ext>
+            </a:extLst>
+          </a:blip>
+          <a:stretch>
+            <a:fillRect/>
+          </a:stretch>
+        </p:blipFill>
+        <p:spPr>
+          <a:xfrm>
+            <a:off x="257846" y="270457"/>
+            <a:ext cx="12298014" cy="6014433"/>
+          </a:xfrm>
+          <a:prstGeom prst="rect">
+            <a:avLst/>
+          </a:prstGeom>
+        </p:spPr>
+      </p:pic>
+    </p:spTree>
+    <p:extLst>
+      <p:ext uri="{BB962C8B-B14F-4D97-AF65-F5344CB8AC3E}">
+        <p14:creationId xmlns:p14="http://schemas.microsoft.com/office/powerpoint/2010/main" val="3180700977"/>
+      </p:ext>
+    </p:extLst>
+  </p:cSld>
+  <p:clrMapOvr>
+    <a:masterClrMapping/>
+  </p:clrMapOvr>
 </p:sld>
 </file>
 

</xml_diff>

<commit_message>
[ChangingLogicLevel] the presentation was complemented
</commit_message>
<xml_diff>
--- a/Tree presentaion.pptx
+++ b/Tree presentaion.pptx
@@ -4502,13 +4502,11 @@
       </p:grpSpPr>
       <p:pic>
         <p:nvPicPr>
-          <p:cNvPr id="3" name="Content Placeholder 2"/>
+          <p:cNvPr id="4" name="Picture 3"/>
           <p:cNvPicPr>
-            <a:picLocks noGrp="1" noChangeAspect="1"/>
+            <a:picLocks noChangeAspect="1"/>
           </p:cNvPicPr>
-          <p:nvPr>
-            <p:ph idx="1"/>
-          </p:nvPr>
+          <p:nvPr/>
         </p:nvPicPr>
         <p:blipFill>
           <a:blip r:embed="rId2">
@@ -4524,9 +4522,12 @@
         </p:blipFill>
         <p:spPr>
           <a:xfrm>
-            <a:off x="-15240" y="661851"/>
-            <a:ext cx="12207240" cy="5529943"/>
+            <a:off x="304800" y="352425"/>
+            <a:ext cx="11582400" cy="6153150"/>
           </a:xfrm>
+          <a:prstGeom prst="rect">
+            <a:avLst/>
+          </a:prstGeom>
         </p:spPr>
       </p:pic>
     </p:spTree>
@@ -4568,7 +4569,7 @@
       </p:grpSpPr>
       <p:pic>
         <p:nvPicPr>
-          <p:cNvPr id="3" name="Picture 2"/>
+          <p:cNvPr id="4" name="Picture 3"/>
           <p:cNvPicPr>
             <a:picLocks noChangeAspect="1"/>
           </p:cNvPicPr>
@@ -4588,14 +4589,68 @@
         </p:blipFill>
         <p:spPr>
           <a:xfrm>
-            <a:off x="679949" y="380047"/>
-            <a:ext cx="10902451" cy="6216402"/>
+            <a:off x="0" y="0"/>
+            <a:ext cx="9167033" cy="6355664"/>
           </a:xfrm>
           <a:prstGeom prst="rect">
             <a:avLst/>
           </a:prstGeom>
         </p:spPr>
       </p:pic>
+      <p:sp>
+        <p:nvSpPr>
+          <p:cNvPr id="5" name="TextBox 4"/>
+          <p:cNvSpPr txBox="1"/>
+          <p:nvPr/>
+        </p:nvSpPr>
+        <p:spPr>
+          <a:xfrm>
+            <a:off x="8628611" y="590204"/>
+            <a:ext cx="3341716" cy="1200329"/>
+          </a:xfrm>
+          <a:prstGeom prst="rect">
+            <a:avLst/>
+          </a:prstGeom>
+          <a:noFill/>
+        </p:spPr>
+        <p:txBody>
+          <a:bodyPr wrap="square" rtlCol="0">
+            <a:spAutoFit/>
+          </a:bodyPr>
+          <a:lstStyle/>
+          <a:p>
+            <a:r>
+              <a:rPr lang="en-US" sz="2400" dirty="0" smtClean="0"/>
+              <a:t>++ </a:t>
+            </a:r>
+            <a:r>
+              <a:rPr lang="ru-RU" sz="2400" dirty="0" smtClean="0"/>
+              <a:t> </a:t>
+            </a:r>
+            <a:r>
+              <a:rPr lang="en-US" sz="2400" dirty="0" smtClean="0"/>
+              <a:t>- </a:t>
+            </a:r>
+            <a:r>
+              <a:rPr lang="ru-RU" sz="2400" dirty="0" smtClean="0"/>
+              <a:t>Строгая</a:t>
+            </a:r>
+          </a:p>
+          <a:p>
+            <a:r>
+              <a:rPr lang="ru-RU" sz="2400" dirty="0" smtClean="0"/>
+              <a:t>**  - Относительная</a:t>
+            </a:r>
+          </a:p>
+          <a:p>
+            <a:r>
+              <a:rPr lang="ru-RU" sz="2400" dirty="0" smtClean="0"/>
+              <a:t>--    - Отсутствие связи</a:t>
+            </a:r>
+            <a:endParaRPr lang="en-US" sz="2400" dirty="0"/>
+          </a:p>
+        </p:txBody>
+      </p:sp>
     </p:spTree>
     <p:extLst>
       <p:ext uri="{BB962C8B-B14F-4D97-AF65-F5344CB8AC3E}">

</xml_diff>